<commit_message>
new configuration of poster (poster2), added challenges in each phase, started writing the rules
</commit_message>
<xml_diff>
--- a/ICPRAM_poster/poster.pptx
+++ b/ICPRAM_poster/poster.pptx
@@ -289,7 +289,7 @@
             <a:fld id="{BFC110DA-795F-41C5-8E6D-063BF805EC2F}" type="datetimeFigureOut">
               <a:rPr lang="en-US" smtClean="0"/>
               <a:pPr/>
-              <a:t>1/11/2016</a:t>
+              <a:t>1/18/2016</a:t>
             </a:fld>
             <a:endParaRPr lang="en-US"/>
           </a:p>
@@ -456,7 +456,7 @@
             <a:fld id="{BFC110DA-795F-41C5-8E6D-063BF805EC2F}" type="datetimeFigureOut">
               <a:rPr lang="en-US" smtClean="0"/>
               <a:pPr/>
-              <a:t>1/11/2016</a:t>
+              <a:t>1/18/2016</a:t>
             </a:fld>
             <a:endParaRPr lang="en-US"/>
           </a:p>
@@ -633,7 +633,7 @@
             <a:fld id="{BFC110DA-795F-41C5-8E6D-063BF805EC2F}" type="datetimeFigureOut">
               <a:rPr lang="en-US" smtClean="0"/>
               <a:pPr/>
-              <a:t>1/11/2016</a:t>
+              <a:t>1/18/2016</a:t>
             </a:fld>
             <a:endParaRPr lang="en-US"/>
           </a:p>
@@ -800,7 +800,7 @@
             <a:fld id="{BFC110DA-795F-41C5-8E6D-063BF805EC2F}" type="datetimeFigureOut">
               <a:rPr lang="en-US" smtClean="0"/>
               <a:pPr/>
-              <a:t>1/11/2016</a:t>
+              <a:t>1/18/2016</a:t>
             </a:fld>
             <a:endParaRPr lang="en-US"/>
           </a:p>
@@ -1043,7 +1043,7 @@
             <a:fld id="{BFC110DA-795F-41C5-8E6D-063BF805EC2F}" type="datetimeFigureOut">
               <a:rPr lang="en-US" smtClean="0"/>
               <a:pPr/>
-              <a:t>1/11/2016</a:t>
+              <a:t>1/18/2016</a:t>
             </a:fld>
             <a:endParaRPr lang="en-US"/>
           </a:p>
@@ -1328,7 +1328,7 @@
             <a:fld id="{BFC110DA-795F-41C5-8E6D-063BF805EC2F}" type="datetimeFigureOut">
               <a:rPr lang="en-US" smtClean="0"/>
               <a:pPr/>
-              <a:t>1/11/2016</a:t>
+              <a:t>1/18/2016</a:t>
             </a:fld>
             <a:endParaRPr lang="en-US"/>
           </a:p>
@@ -1752,7 +1752,7 @@
             <a:fld id="{BFC110DA-795F-41C5-8E6D-063BF805EC2F}" type="datetimeFigureOut">
               <a:rPr lang="en-US" smtClean="0"/>
               <a:pPr/>
-              <a:t>1/11/2016</a:t>
+              <a:t>1/18/2016</a:t>
             </a:fld>
             <a:endParaRPr lang="en-US"/>
           </a:p>
@@ -1867,7 +1867,7 @@
             <a:fld id="{BFC110DA-795F-41C5-8E6D-063BF805EC2F}" type="datetimeFigureOut">
               <a:rPr lang="en-US" smtClean="0"/>
               <a:pPr/>
-              <a:t>1/11/2016</a:t>
+              <a:t>1/18/2016</a:t>
             </a:fld>
             <a:endParaRPr lang="en-US"/>
           </a:p>
@@ -1959,7 +1959,7 @@
             <a:fld id="{BFC110DA-795F-41C5-8E6D-063BF805EC2F}" type="datetimeFigureOut">
               <a:rPr lang="en-US" smtClean="0"/>
               <a:pPr/>
-              <a:t>1/11/2016</a:t>
+              <a:t>1/18/2016</a:t>
             </a:fld>
             <a:endParaRPr lang="en-US"/>
           </a:p>
@@ -2233,7 +2233,7 @@
             <a:fld id="{BFC110DA-795F-41C5-8E6D-063BF805EC2F}" type="datetimeFigureOut">
               <a:rPr lang="en-US" smtClean="0"/>
               <a:pPr/>
-              <a:t>1/11/2016</a:t>
+              <a:t>1/18/2016</a:t>
             </a:fld>
             <a:endParaRPr lang="en-US"/>
           </a:p>
@@ -2483,7 +2483,7 @@
             <a:fld id="{BFC110DA-795F-41C5-8E6D-063BF805EC2F}" type="datetimeFigureOut">
               <a:rPr lang="en-US" smtClean="0"/>
               <a:pPr/>
-              <a:t>1/11/2016</a:t>
+              <a:t>1/18/2016</a:t>
             </a:fld>
             <a:endParaRPr lang="en-US"/>
           </a:p>
@@ -2693,7 +2693,7 @@
             <a:fld id="{BFC110DA-795F-41C5-8E6D-063BF805EC2F}" type="datetimeFigureOut">
               <a:rPr lang="en-US" smtClean="0"/>
               <a:pPr/>
-              <a:t>1/11/2016</a:t>
+              <a:t>1/18/2016</a:t>
             </a:fld>
             <a:endParaRPr lang="en-US"/>
           </a:p>
@@ -3073,7 +3073,7 @@
         <p:spPr>
           <a:xfrm>
             <a:off x="619817" y="32172351"/>
-            <a:ext cx="16502178" cy="9858444"/>
+            <a:ext cx="17814282" cy="9858444"/>
           </a:xfrm>
           <a:prstGeom prst="rect">
             <a:avLst/>
@@ -3099,13 +3099,13 @@
           <a:p>
             <a:pPr algn="ctr"/>
             <a:r>
-              <a:rPr lang="en-US" sz="4800" cap="small" dirty="0" smtClean="0">
+              <a:rPr lang="en-US" sz="4800" cap="all" dirty="0" smtClean="0">
                 <a:latin typeface="Arial Black" pitchFamily="34" charset="0"/>
                 <a:cs typeface="Arial" pitchFamily="34" charset="0"/>
               </a:rPr>
               <a:t>Recovery of final partition</a:t>
             </a:r>
-            <a:endParaRPr lang="en-US" sz="4800" cap="small" dirty="0">
+            <a:endParaRPr lang="en-US" sz="4800" cap="all" dirty="0">
               <a:latin typeface="Arial Black" pitchFamily="34" charset="0"/>
               <a:cs typeface="Arial" pitchFamily="34" charset="0"/>
             </a:endParaRPr>
@@ -3121,11 +3121,33 @@
         <p:spPr>
           <a:xfrm>
             <a:off x="619817" y="15384421"/>
-            <a:ext cx="29003828" cy="9215502"/>
+            <a:ext cx="29003828" cy="8025058"/>
           </a:xfrm>
           <a:prstGeom prst="rect">
             <a:avLst/>
           </a:prstGeom>
+          <a:gradFill>
+            <a:gsLst>
+              <a:gs pos="0">
+                <a:schemeClr val="accent1">
+                  <a:tint val="50000"/>
+                  <a:satMod val="300000"/>
+                </a:schemeClr>
+              </a:gs>
+              <a:gs pos="34000">
+                <a:schemeClr val="accent1">
+                  <a:tint val="37000"/>
+                  <a:satMod val="300000"/>
+                </a:schemeClr>
+              </a:gs>
+              <a:gs pos="100000">
+                <a:schemeClr val="accent1">
+                  <a:tint val="15000"/>
+                  <a:satMod val="350000"/>
+                </a:schemeClr>
+              </a:gs>
+            </a:gsLst>
+          </a:gradFill>
         </p:spPr>
         <p:style>
           <a:lnRef idx="1">
@@ -3147,20 +3169,16 @@
           <a:p>
             <a:pPr algn="ctr"/>
             <a:r>
-              <a:rPr lang="en-US" sz="4800" cap="small" dirty="0" smtClean="0">
+              <a:rPr lang="en-US" sz="4800" cap="all" dirty="0" smtClean="0">
                 <a:latin typeface="Arial Black" pitchFamily="34" charset="0"/>
                 <a:cs typeface="Arial" pitchFamily="34" charset="0"/>
               </a:rPr>
               <a:t>Production of ensemble</a:t>
             </a:r>
-            <a:endParaRPr lang="en-US" sz="4800" cap="small" dirty="0" smtClean="0">
-              <a:latin typeface="Arial Black" pitchFamily="34" charset="0"/>
-              <a:cs typeface="Arial" pitchFamily="34" charset="0"/>
-            </a:endParaRPr>
           </a:p>
           <a:p>
             <a:pPr algn="ctr"/>
-            <a:endParaRPr lang="en-US" sz="4800" cap="small" dirty="0">
+            <a:endParaRPr lang="en-US" sz="4800" cap="all" dirty="0">
               <a:latin typeface="Arial Black" pitchFamily="34" charset="0"/>
               <a:cs typeface="Arial" pitchFamily="34" charset="0"/>
             </a:endParaRPr>
@@ -3210,108 +3228,14 @@
       </p:sp>
       <p:sp>
         <p:nvSpPr>
-          <p:cNvPr id="4" name="CaixaDeTexto 3"/>
-          <p:cNvSpPr txBox="1"/>
-          <p:nvPr/>
-        </p:nvSpPr>
-        <p:spPr>
-          <a:xfrm>
-            <a:off x="476941" y="7526241"/>
-            <a:ext cx="9787006" cy="6355586"/>
-          </a:xfrm>
-          <a:prstGeom prst="rect">
-            <a:avLst/>
-          </a:prstGeom>
-          <a:ln/>
-        </p:spPr>
-        <p:style>
-          <a:lnRef idx="1">
-            <a:schemeClr val="dk1"/>
-          </a:lnRef>
-          <a:fillRef idx="2">
-            <a:schemeClr val="dk1"/>
-          </a:fillRef>
-          <a:effectRef idx="1">
-            <a:schemeClr val="dk1"/>
-          </a:effectRef>
-          <a:fontRef idx="minor">
-            <a:schemeClr val="dk1"/>
-          </a:fontRef>
-        </p:style>
-        <p:txBody>
-          <a:bodyPr wrap="square" lIns="180000" rIns="180000" rtlCol="0">
-            <a:spAutoFit/>
-          </a:bodyPr>
-          <a:lstStyle/>
-          <a:p>
-            <a:pPr algn="just"/>
-            <a:r>
-              <a:rPr lang="en-US" sz="6600" cap="small" dirty="0" smtClean="0">
-                <a:latin typeface="Arial Black" pitchFamily="34" charset="0"/>
-                <a:cs typeface="Arial" pitchFamily="34" charset="0"/>
-              </a:rPr>
-              <a:t>Introduction</a:t>
-            </a:r>
-          </a:p>
-          <a:p>
-            <a:pPr marL="432000" indent="-457200" algn="just">
-              <a:spcAft>
-                <a:spcPts val="600"/>
-              </a:spcAft>
-              <a:buFont typeface="Arial" pitchFamily="34" charset="0"/>
-              <a:buChar char="•"/>
-            </a:pPr>
-            <a:r>
-              <a:rPr lang="en-US" sz="4800" dirty="0" smtClean="0">
-                <a:latin typeface="Arial" pitchFamily="34" charset="0"/>
-                <a:cs typeface="Arial" pitchFamily="34" charset="0"/>
-              </a:rPr>
-              <a:t>EAC is robust but its computational complexity restricts is use to small datasets</a:t>
-            </a:r>
-            <a:r>
-              <a:rPr lang="en-US" sz="4800" dirty="0" smtClean="0">
-                <a:latin typeface="Arial" pitchFamily="34" charset="0"/>
-                <a:cs typeface="Arial" pitchFamily="34" charset="0"/>
-              </a:rPr>
-              <a:t>.</a:t>
-            </a:r>
-            <a:endParaRPr lang="en-US" sz="4800" dirty="0" smtClean="0">
-              <a:latin typeface="Arial" pitchFamily="34" charset="0"/>
-              <a:cs typeface="Arial" pitchFamily="34" charset="0"/>
-            </a:endParaRPr>
-          </a:p>
-          <a:p>
-            <a:pPr marL="432000" indent="-457200" algn="just">
-              <a:spcAft>
-                <a:spcPts val="600"/>
-              </a:spcAft>
-              <a:buFont typeface="Arial" pitchFamily="34" charset="0"/>
-              <a:buChar char="•"/>
-            </a:pPr>
-            <a:r>
-              <a:rPr lang="en-US" sz="4800" dirty="0" smtClean="0">
-                <a:latin typeface="Arial" pitchFamily="34" charset="0"/>
-                <a:cs typeface="Arial" pitchFamily="34" charset="0"/>
-              </a:rPr>
-              <a:t>We propose an optimized implementation of the different EAC steps for faster execution and decreased memory usage.</a:t>
-            </a:r>
-            <a:endParaRPr lang="en-US" sz="7200" dirty="0">
-              <a:latin typeface="Arial" pitchFamily="34" charset="0"/>
-              <a:cs typeface="Arial" pitchFamily="34" charset="0"/>
-            </a:endParaRPr>
-          </a:p>
-        </p:txBody>
-      </p:sp>
-      <p:sp>
-        <p:nvSpPr>
           <p:cNvPr id="5" name="CaixaDeTexto 4"/>
           <p:cNvSpPr txBox="1"/>
           <p:nvPr/>
         </p:nvSpPr>
         <p:spPr>
           <a:xfrm>
-            <a:off x="5334725" y="695298"/>
-            <a:ext cx="20100887" cy="2616101"/>
+            <a:off x="6100970" y="926246"/>
+            <a:ext cx="18041523" cy="2308324"/>
           </a:xfrm>
           <a:prstGeom prst="rect">
             <a:avLst/>
@@ -3332,13 +3256,14 @@
           </a:fontRef>
         </p:style>
         <p:txBody>
-          <a:bodyPr wrap="none" rtlCol="0">
+          <a:bodyPr wrap="square" rtlCol="0">
             <a:spAutoFit/>
           </a:bodyPr>
           <a:lstStyle/>
           <a:p>
-            <a:r>
-              <a:rPr lang="en-US" dirty="0" smtClean="0">
+            <a:pPr algn="ctr"/>
+            <a:r>
+              <a:rPr lang="en-US" sz="7200" dirty="0" smtClean="0">
                 <a:latin typeface="Arial" pitchFamily="34" charset="0"/>
                 <a:cs typeface="Arial" pitchFamily="34" charset="0"/>
               </a:rPr>
@@ -3348,13 +3273,13 @@
           <a:p>
             <a:pPr algn="ctr"/>
             <a:r>
-              <a:rPr lang="en-US" dirty="0" smtClean="0">
+              <a:rPr lang="en-US" sz="7200" dirty="0" smtClean="0">
                 <a:latin typeface="Arial" pitchFamily="34" charset="0"/>
                 <a:cs typeface="Arial" pitchFamily="34" charset="0"/>
               </a:rPr>
               <a:t>for large datasets</a:t>
             </a:r>
-            <a:endParaRPr lang="en-US" dirty="0">
+            <a:endParaRPr lang="en-US" sz="7200" dirty="0">
               <a:latin typeface="Arial" pitchFamily="34" charset="0"/>
               <a:cs typeface="Arial" pitchFamily="34" charset="0"/>
             </a:endParaRPr>
@@ -3369,7 +3294,7 @@
         </p:nvSpPr>
         <p:spPr>
           <a:xfrm>
-            <a:off x="4548907" y="3668589"/>
+            <a:off x="4656064" y="3668589"/>
             <a:ext cx="20931334" cy="3231654"/>
           </a:xfrm>
           <a:prstGeom prst="rect">
@@ -3595,7 +3520,7 @@
         </p:blipFill>
         <p:spPr>
           <a:xfrm>
-            <a:off x="1405635" y="1679625"/>
+            <a:off x="1961937" y="1679625"/>
             <a:ext cx="2214578" cy="2989096"/>
           </a:xfrm>
           <a:prstGeom prst="rect">
@@ -3619,7 +3544,7 @@
         </p:blipFill>
         <p:spPr>
           <a:xfrm>
-            <a:off x="25123051" y="2382705"/>
+            <a:off x="24842811" y="2315511"/>
             <a:ext cx="4429156" cy="1717324"/>
           </a:xfrm>
           <a:prstGeom prst="rect">
@@ -3643,82 +3568,24 @@
         </p:blipFill>
         <p:spPr>
           <a:xfrm>
-            <a:off x="8692311" y="16813181"/>
+            <a:off x="10945267" y="17563280"/>
             <a:ext cx="6697185" cy="4929222"/>
           </a:xfrm>
           <a:prstGeom prst="rect">
             <a:avLst/>
           </a:prstGeom>
+          <a:solidFill>
+            <a:schemeClr val="bg1"/>
+          </a:solidFill>
+          <a:effectLst>
+            <a:outerShdw blurRad="63500" sx="102000" sy="102000" algn="ctr" rotWithShape="0">
+              <a:prstClr val="black">
+                <a:alpha val="40000"/>
+              </a:prstClr>
+            </a:outerShdw>
+          </a:effectLst>
         </p:spPr>
       </p:pic>
-      <p:sp>
-        <p:nvSpPr>
-          <p:cNvPr id="10" name="CaixaDeTexto 9"/>
-          <p:cNvSpPr txBox="1"/>
-          <p:nvPr/>
-        </p:nvSpPr>
-        <p:spPr>
-          <a:xfrm>
-            <a:off x="17979251" y="35029871"/>
-            <a:ext cx="11787270" cy="5355312"/>
-          </a:xfrm>
-          <a:prstGeom prst="rect">
-            <a:avLst/>
-          </a:prstGeom>
-          <a:noFill/>
-          <a:ln>
-            <a:solidFill>
-              <a:schemeClr val="tx1"/>
-            </a:solidFill>
-          </a:ln>
-        </p:spPr>
-        <p:txBody>
-          <a:bodyPr wrap="square" rtlCol="0">
-            <a:spAutoFit/>
-          </a:bodyPr>
-          <a:lstStyle/>
-          <a:p>
-            <a:pPr algn="just"/>
-            <a:r>
-              <a:rPr lang="en-US" sz="7200" cap="small" dirty="0" smtClean="0">
-                <a:latin typeface="Arial Black" pitchFamily="34" charset="0"/>
-                <a:cs typeface="Arial" pitchFamily="34" charset="0"/>
-              </a:rPr>
-              <a:t>Conclusions</a:t>
-            </a:r>
-            <a:endParaRPr lang="en-US" cap="small" dirty="0" smtClean="0">
-              <a:latin typeface="Arial Black" pitchFamily="34" charset="0"/>
-              <a:cs typeface="Arial" pitchFamily="34" charset="0"/>
-            </a:endParaRPr>
-          </a:p>
-          <a:p>
-            <a:pPr algn="just">
-              <a:buFont typeface="Arial" pitchFamily="34" charset="0"/>
-              <a:buChar char="•"/>
-            </a:pPr>
-            <a:r>
-              <a:rPr lang="en-US" sz="5400" dirty="0" smtClean="0">
-                <a:latin typeface="Arial" pitchFamily="34" charset="0"/>
-                <a:cs typeface="Arial" pitchFamily="34" charset="0"/>
-              </a:rPr>
-              <a:t>EAC is now applicable to a wider spectrum of datasets.</a:t>
-            </a:r>
-          </a:p>
-          <a:p>
-            <a:pPr algn="just">
-              <a:buFont typeface="Arial" pitchFamily="34" charset="0"/>
-              <a:buChar char="•"/>
-            </a:pPr>
-            <a:r>
-              <a:rPr lang="en-US" sz="5400" dirty="0" smtClean="0">
-                <a:latin typeface="Arial" pitchFamily="34" charset="0"/>
-                <a:cs typeface="Arial" pitchFamily="34" charset="0"/>
-              </a:rPr>
-              <a:t>Speed-up from 6 to 200 compared to original implementation on the different phases.</a:t>
-            </a:r>
-          </a:p>
-        </p:txBody>
-      </p:sp>
       <p:sp>
         <p:nvSpPr>
           <p:cNvPr id="70" name="CaixaDeTexto 69"/>
@@ -3774,8 +3641,8 @@
         </p:nvSpPr>
         <p:spPr>
           <a:xfrm>
-            <a:off x="4048841" y="21313775"/>
-            <a:ext cx="4000528" cy="1571636"/>
+            <a:off x="5753285" y="20826720"/>
+            <a:ext cx="3537961" cy="1987267"/>
           </a:xfrm>
           <a:prstGeom prst="roundRect">
             <a:avLst/>
@@ -3801,13 +3668,30 @@
           <a:p>
             <a:pPr algn="ctr"/>
             <a:r>
-              <a:rPr lang="en-US" sz="4800" dirty="0" smtClean="0">
-                <a:latin typeface="Arial" pitchFamily="34" charset="0"/>
-                <a:cs typeface="Arial" pitchFamily="34" charset="0"/>
-              </a:rPr>
-              <a:t>Parallel GPU K-Means</a:t>
-            </a:r>
-            <a:endParaRPr lang="en-US" sz="4800" dirty="0">
+              <a:rPr lang="en-US" sz="3600" dirty="0" smtClean="0">
+                <a:latin typeface="Arial Black" pitchFamily="34" charset="0"/>
+                <a:cs typeface="Arial" pitchFamily="34" charset="0"/>
+              </a:rPr>
+              <a:t>Solution</a:t>
+            </a:r>
+          </a:p>
+          <a:p>
+            <a:pPr algn="ctr"/>
+            <a:r>
+              <a:rPr lang="en-US" sz="3600" dirty="0" smtClean="0">
+                <a:latin typeface="Arial" pitchFamily="34" charset="0"/>
+                <a:cs typeface="Arial" pitchFamily="34" charset="0"/>
+              </a:rPr>
+              <a:t>Parallel </a:t>
+            </a:r>
+            <a:r>
+              <a:rPr lang="en-US" sz="3600" dirty="0" smtClean="0">
+                <a:latin typeface="Arial" pitchFamily="34" charset="0"/>
+                <a:cs typeface="Arial" pitchFamily="34" charset="0"/>
+              </a:rPr>
+              <a:t>GPU K-Means</a:t>
+            </a:r>
+            <a:endParaRPr lang="en-US" sz="3600" dirty="0">
               <a:latin typeface="Arial" pitchFamily="34" charset="0"/>
               <a:cs typeface="Arial" pitchFamily="34" charset="0"/>
             </a:endParaRPr>
@@ -3863,8 +3747,8 @@
         </p:nvSpPr>
         <p:spPr>
           <a:xfrm>
-            <a:off x="619817" y="24671361"/>
-            <a:ext cx="29003828" cy="7143800"/>
+            <a:off x="778098" y="24050649"/>
+            <a:ext cx="29003828" cy="7714701"/>
           </a:xfrm>
           <a:prstGeom prst="rect">
             <a:avLst/>
@@ -3890,16 +3774,12 @@
           <a:p>
             <a:pPr algn="ctr"/>
             <a:r>
-              <a:rPr lang="en-US" sz="4800" cap="small" dirty="0" smtClean="0">
+              <a:rPr lang="en-US" sz="4800" cap="all" dirty="0" smtClean="0">
                 <a:latin typeface="Arial Black" pitchFamily="34" charset="0"/>
                 <a:cs typeface="Arial" pitchFamily="34" charset="0"/>
               </a:rPr>
               <a:t>Combination of partitions</a:t>
             </a:r>
-            <a:endParaRPr lang="en-US" sz="4800" cap="small" dirty="0" smtClean="0">
-              <a:latin typeface="Arial Black" pitchFamily="34" charset="0"/>
-              <a:cs typeface="Arial" pitchFamily="34" charset="0"/>
-            </a:endParaRPr>
           </a:p>
           <a:p>
             <a:pPr algn="ctr"/>
@@ -3927,12 +3807,19 @@
         </p:blipFill>
         <p:spPr>
           <a:xfrm>
-            <a:off x="9978195" y="25171427"/>
-            <a:ext cx="6143668" cy="6513083"/>
+            <a:off x="12165137" y="25777604"/>
+            <a:ext cx="5055932" cy="5359942"/>
           </a:xfrm>
           <a:prstGeom prst="rect">
             <a:avLst/>
           </a:prstGeom>
+          <a:effectLst>
+            <a:outerShdw blurRad="63500" sx="102000" sy="102000" algn="ctr" rotWithShape="0">
+              <a:prstClr val="black">
+                <a:alpha val="40000"/>
+              </a:prstClr>
+            </a:outerShdw>
+          </a:effectLst>
         </p:spPr>
       </p:pic>
       <p:pic>
@@ -3952,12 +3839,19 @@
         </p:blipFill>
         <p:spPr>
           <a:xfrm>
-            <a:off x="17693499" y="25171427"/>
+            <a:off x="21429516" y="24992832"/>
             <a:ext cx="7538810" cy="6572296"/>
           </a:xfrm>
           <a:prstGeom prst="rect">
             <a:avLst/>
           </a:prstGeom>
+          <a:effectLst>
+            <a:outerShdw blurRad="63500" sx="102000" sy="102000" algn="ctr" rotWithShape="0">
+              <a:prstClr val="black">
+                <a:alpha val="40000"/>
+              </a:prstClr>
+            </a:outerShdw>
+          </a:effectLst>
         </p:spPr>
       </p:pic>
       <p:pic>
@@ -3977,12 +3871,19 @@
         </p:blipFill>
         <p:spPr>
           <a:xfrm>
-            <a:off x="12049897" y="33243921"/>
+            <a:off x="7405948" y="33555705"/>
             <a:ext cx="5286412" cy="5604281"/>
           </a:xfrm>
           <a:prstGeom prst="rect">
             <a:avLst/>
           </a:prstGeom>
+          <a:effectLst>
+            <a:outerShdw blurRad="63500" sx="102000" sy="102000" algn="ctr" rotWithShape="0">
+              <a:prstClr val="black">
+                <a:alpha val="40000"/>
+              </a:prstClr>
+            </a:outerShdw>
+          </a:effectLst>
         </p:spPr>
       </p:pic>
       <p:sp>
@@ -4053,8 +3954,8 @@
         </p:nvSpPr>
         <p:spPr>
           <a:xfrm>
-            <a:off x="6763485" y="27243129"/>
-            <a:ext cx="4000528" cy="2071702"/>
+            <a:off x="4834659" y="29314831"/>
+            <a:ext cx="5318520" cy="2071702"/>
           </a:xfrm>
           <a:prstGeom prst="roundRect">
             <a:avLst/>
@@ -4081,10 +3982,27 @@
             <a:pPr algn="ctr"/>
             <a:r>
               <a:rPr lang="en-US" sz="3600" dirty="0" smtClean="0">
-                <a:latin typeface="Arial" pitchFamily="34" charset="0"/>
-                <a:cs typeface="Arial" pitchFamily="34" charset="0"/>
-              </a:rPr>
-              <a:t>CSR sparse matrix with optimized building</a:t>
+                <a:latin typeface="Arial Black" pitchFamily="34" charset="0"/>
+                <a:cs typeface="Arial" pitchFamily="34" charset="0"/>
+              </a:rPr>
+              <a:t>Solution</a:t>
+            </a:r>
+          </a:p>
+          <a:p>
+            <a:pPr algn="ctr"/>
+            <a:r>
+              <a:rPr lang="en-US" sz="3600" dirty="0" smtClean="0">
+                <a:latin typeface="Arial" pitchFamily="34" charset="0"/>
+                <a:cs typeface="Arial" pitchFamily="34" charset="0"/>
+              </a:rPr>
+              <a:t>CSR </a:t>
+            </a:r>
+            <a:r>
+              <a:rPr lang="en-US" sz="3600" dirty="0" smtClean="0">
+                <a:latin typeface="Arial" pitchFamily="34" charset="0"/>
+                <a:cs typeface="Arial" pitchFamily="34" charset="0"/>
+              </a:rPr>
+              <a:t>sparse matrix with optimized building</a:t>
             </a:r>
             <a:endParaRPr lang="en-US" sz="3600" dirty="0">
               <a:latin typeface="Arial" pitchFamily="34" charset="0"/>
@@ -4192,8 +4110,8 @@
         </p:nvSpPr>
         <p:spPr>
           <a:xfrm>
-            <a:off x="2048577" y="37815953"/>
-            <a:ext cx="4000528" cy="1643074"/>
+            <a:off x="1400123" y="39691811"/>
+            <a:ext cx="4000528" cy="2188683"/>
           </a:xfrm>
           <a:prstGeom prst="roundRect">
             <a:avLst/>
@@ -4219,11 +4137,32 @@
           <a:p>
             <a:pPr algn="ctr"/>
             <a:r>
+              <a:rPr lang="en-US" sz="3600" dirty="0">
+                <a:latin typeface="Arial Black" pitchFamily="34" charset="0"/>
+                <a:cs typeface="Arial" pitchFamily="34" charset="0"/>
+              </a:rPr>
+              <a:t>Solution</a:t>
+            </a:r>
+            <a:endParaRPr lang="en-US" sz="3600" dirty="0" smtClean="0">
+              <a:latin typeface="Arial" pitchFamily="34" charset="0"/>
+              <a:cs typeface="Arial" pitchFamily="34" charset="0"/>
+            </a:endParaRPr>
+          </a:p>
+          <a:p>
+            <a:pPr algn="ctr"/>
+            <a:r>
               <a:rPr lang="en-US" sz="3600" dirty="0" smtClean="0">
                 <a:latin typeface="Arial" pitchFamily="34" charset="0"/>
                 <a:cs typeface="Arial" pitchFamily="34" charset="0"/>
               </a:rPr>
-              <a:t>MST based SL</a:t>
+              <a:t>MST </a:t>
+            </a:r>
+            <a:r>
+              <a:rPr lang="en-US" sz="3600" dirty="0" smtClean="0">
+                <a:latin typeface="Arial" pitchFamily="34" charset="0"/>
+                <a:cs typeface="Arial" pitchFamily="34" charset="0"/>
+              </a:rPr>
+              <a:t>based SL</a:t>
             </a:r>
           </a:p>
           <a:p>
@@ -4541,70 +4480,6 @@
           </p:txBody>
         </p:sp>
       </p:grpSp>
-      <p:sp>
-        <p:nvSpPr>
-          <p:cNvPr id="50" name="CaixaDeTexto 49"/>
-          <p:cNvSpPr txBox="1"/>
-          <p:nvPr/>
-        </p:nvSpPr>
-        <p:spPr>
-          <a:xfrm>
-            <a:off x="23551415" y="9812257"/>
-            <a:ext cx="8215370" cy="4801314"/>
-          </a:xfrm>
-          <a:prstGeom prst="rect">
-            <a:avLst/>
-          </a:prstGeom>
-          <a:ln/>
-        </p:spPr>
-        <p:style>
-          <a:lnRef idx="1">
-            <a:schemeClr val="dk1"/>
-          </a:lnRef>
-          <a:fillRef idx="2">
-            <a:schemeClr val="dk1"/>
-          </a:fillRef>
-          <a:effectRef idx="1">
-            <a:schemeClr val="dk1"/>
-          </a:effectRef>
-          <a:fontRef idx="minor">
-            <a:schemeClr val="dk1"/>
-          </a:fontRef>
-        </p:style>
-        <p:txBody>
-          <a:bodyPr wrap="square" lIns="180000" rIns="180000" rtlCol="0">
-            <a:spAutoFit/>
-          </a:bodyPr>
-          <a:lstStyle/>
-          <a:p>
-            <a:pPr algn="just"/>
-            <a:r>
-              <a:rPr lang="en-US" sz="7200" cap="small" dirty="0" smtClean="0">
-                <a:latin typeface="Arial Black" pitchFamily="34" charset="0"/>
-                <a:cs typeface="Arial" pitchFamily="34" charset="0"/>
-              </a:rPr>
-              <a:t>Rules</a:t>
-            </a:r>
-          </a:p>
-          <a:p>
-            <a:pPr algn="just"/>
-            <a:r>
-              <a:rPr lang="en-US" sz="5400" dirty="0" smtClean="0">
-                <a:latin typeface="Arial" pitchFamily="34" charset="0"/>
-                <a:cs typeface="Arial" pitchFamily="34" charset="0"/>
-              </a:rPr>
-              <a:t>The number of clusters in the partitions of the ensemble </a:t>
-            </a:r>
-          </a:p>
-          <a:p>
-            <a:pPr algn="just"/>
-            <a:endParaRPr lang="en-US" sz="7200" cap="small" dirty="0" smtClean="0">
-              <a:latin typeface="Arial Black" pitchFamily="34" charset="0"/>
-              <a:cs typeface="Arial" pitchFamily="34" charset="0"/>
-            </a:endParaRPr>
-          </a:p>
-        </p:txBody>
-      </p:sp>
       <p:pic>
         <p:nvPicPr>
           <p:cNvPr id="51" name="Imagem 50" descr="kmin_evolution.png"/>
@@ -4621,29 +4496,38 @@
         </p:blipFill>
         <p:spPr>
           <a:xfrm>
-            <a:off x="18336441" y="19027759"/>
-            <a:ext cx="5962650" cy="3810000"/>
+            <a:off x="20954379" y="17706846"/>
+            <a:ext cx="7530195" cy="4811626"/>
           </a:xfrm>
           <a:prstGeom prst="rect">
             <a:avLst/>
           </a:prstGeom>
+          <a:ln>
+            <a:noFill/>
+          </a:ln>
+          <a:effectLst>
+            <a:outerShdw blurRad="190500" algn="tl" rotWithShape="0">
+              <a:srgbClr val="000000">
+                <a:alpha val="70000"/>
+              </a:srgbClr>
+            </a:outerShdw>
+          </a:effectLst>
         </p:spPr>
       </p:pic>
       <p:sp>
         <p:nvSpPr>
-          <p:cNvPr id="53" name="CaixaDeTexto 52"/>
-          <p:cNvSpPr txBox="1"/>
+          <p:cNvPr id="2" name="Rectângulo 1"/>
+          <p:cNvSpPr/>
           <p:nvPr/>
         </p:nvSpPr>
         <p:spPr>
           <a:xfrm>
-            <a:off x="10549699" y="7526241"/>
-            <a:ext cx="12644526" cy="7171194"/>
+            <a:off x="600322" y="7526241"/>
+            <a:ext cx="9156346" cy="6332634"/>
           </a:xfrm>
           <a:prstGeom prst="rect">
             <a:avLst/>
           </a:prstGeom>
-          <a:ln/>
         </p:spPr>
         <p:style>
           <a:lnRef idx="1">
@@ -4660,30 +4544,97 @@
           </a:fontRef>
         </p:style>
         <p:txBody>
-          <a:bodyPr wrap="square" lIns="180000" rIns="180000" rtlCol="0">
-            <a:spAutoFit/>
-          </a:bodyPr>
+          <a:bodyPr lIns="180000" rIns="180000" rtlCol="0" anchor="t" anchorCtr="0"/>
           <a:lstStyle/>
           <a:p>
             <a:pPr algn="just"/>
             <a:r>
-              <a:rPr lang="en-US" sz="7200" cap="small" dirty="0" smtClean="0">
+              <a:rPr lang="en-US" sz="6600" cap="small" dirty="0">
                 <a:latin typeface="Arial Black" pitchFamily="34" charset="0"/>
                 <a:cs typeface="Arial" pitchFamily="34" charset="0"/>
               </a:rPr>
-              <a:t>Validation and Speed-</a:t>
-            </a:r>
-            <a:r>
-              <a:rPr lang="en-US" sz="7200" cap="small" dirty="0" smtClean="0">
+              <a:t>Introduction</a:t>
+            </a:r>
+          </a:p>
+          <a:p>
+            <a:pPr marL="432000" indent="-457200" algn="just">
+              <a:spcAft>
+                <a:spcPts val="600"/>
+              </a:spcAft>
+              <a:buFont typeface="Arial" pitchFamily="34" charset="0"/>
+              <a:buChar char="•"/>
+            </a:pPr>
+            <a:r>
+              <a:rPr lang="en-US" sz="4000" dirty="0">
+                <a:latin typeface="Arial" pitchFamily="34" charset="0"/>
+                <a:cs typeface="Arial" pitchFamily="34" charset="0"/>
+              </a:rPr>
+              <a:t>EAC is robust but its computational complexity restricts is use to small datasets.</a:t>
+            </a:r>
+          </a:p>
+          <a:p>
+            <a:pPr marL="432000" indent="-457200" algn="just">
+              <a:spcAft>
+                <a:spcPts val="600"/>
+              </a:spcAft>
+              <a:buFont typeface="Arial" pitchFamily="34" charset="0"/>
+              <a:buChar char="•"/>
+            </a:pPr>
+            <a:r>
+              <a:rPr lang="en-US" sz="4000" dirty="0">
+                <a:latin typeface="Arial" pitchFamily="34" charset="0"/>
+                <a:cs typeface="Arial" pitchFamily="34" charset="0"/>
+              </a:rPr>
+              <a:t>We propose an optimized implementation of the different EAC steps for faster execution and decreased memory usage.</a:t>
+            </a:r>
+          </a:p>
+          <a:p>
+            <a:pPr algn="ctr"/>
+            <a:endParaRPr lang="en-US" sz="4800" dirty="0"/>
+          </a:p>
+        </p:txBody>
+      </p:sp>
+      <p:sp>
+        <p:nvSpPr>
+          <p:cNvPr id="35" name="Rectângulo 34"/>
+          <p:cNvSpPr/>
+          <p:nvPr/>
+        </p:nvSpPr>
+        <p:spPr>
+          <a:xfrm>
+            <a:off x="10380745" y="7488809"/>
+            <a:ext cx="11149219" cy="6332634"/>
+          </a:xfrm>
+          <a:prstGeom prst="rect">
+            <a:avLst/>
+          </a:prstGeom>
+        </p:spPr>
+        <p:style>
+          <a:lnRef idx="1">
+            <a:schemeClr val="dk1"/>
+          </a:lnRef>
+          <a:fillRef idx="2">
+            <a:schemeClr val="dk1"/>
+          </a:fillRef>
+          <a:effectRef idx="1">
+            <a:schemeClr val="dk1"/>
+          </a:effectRef>
+          <a:fontRef idx="minor">
+            <a:schemeClr val="dk1"/>
+          </a:fontRef>
+        </p:style>
+        <p:txBody>
+          <a:bodyPr lIns="180000" rIns="180000" rtlCol="0" anchor="t" anchorCtr="0"/>
+          <a:lstStyle/>
+          <a:p>
+            <a:pPr algn="just"/>
+            <a:r>
+              <a:rPr lang="en-US" sz="6600" cap="small" dirty="0">
                 <a:latin typeface="Arial Black" pitchFamily="34" charset="0"/>
                 <a:cs typeface="Arial" pitchFamily="34" charset="0"/>
               </a:rPr>
-              <a:t>up</a:t>
-            </a:r>
-            <a:endParaRPr lang="en-US" sz="7200" cap="small" dirty="0" smtClean="0">
-              <a:latin typeface="Arial Black" pitchFamily="34" charset="0"/>
-              <a:cs typeface="Arial" pitchFamily="34" charset="0"/>
-            </a:endParaRPr>
+              <a:t>Validation and Speed-up</a:t>
+            </a:r>
           </a:p>
           <a:p>
             <a:pPr marL="432000" indent="-457200" algn="just">
@@ -4694,16 +4645,12 @@
               <a:buChar char="•"/>
             </a:pPr>
             <a:r>
-              <a:rPr lang="en-US" sz="5400" dirty="0" smtClean="0">
+              <a:rPr lang="en-US" sz="4000" dirty="0">
                 <a:latin typeface="Arial" pitchFamily="34" charset="0"/>
                 <a:cs typeface="Arial" pitchFamily="34" charset="0"/>
               </a:rPr>
               <a:t>The clustering accuracy of the optimized version relative to the original on several small benchmark datasets is negligible </a:t>
             </a:r>
-            <a:endParaRPr lang="en-US" sz="5400" dirty="0" smtClean="0">
-              <a:latin typeface="Arial" pitchFamily="34" charset="0"/>
-              <a:cs typeface="Arial" pitchFamily="34" charset="0"/>
-            </a:endParaRPr>
           </a:p>
           <a:p>
             <a:pPr marL="432000" indent="-457200" algn="just">
@@ -4714,14 +4661,343 @@
               <a:buChar char="•"/>
             </a:pPr>
             <a:r>
-              <a:rPr lang="en-US" sz="5400" dirty="0" smtClean="0">
+              <a:rPr lang="en-US" sz="4000" dirty="0">
                 <a:latin typeface="Arial" pitchFamily="34" charset="0"/>
                 <a:cs typeface="Arial" pitchFamily="34" charset="0"/>
               </a:rPr>
               <a:t>Speed-up over the original version on small datasets varied between 6 and 200 on the different EAC phases.</a:t>
             </a:r>
-            <a:endParaRPr lang="en-US" sz="7200" cap="small" dirty="0" smtClean="0">
+          </a:p>
+        </p:txBody>
+      </p:sp>
+      <p:sp>
+        <p:nvSpPr>
+          <p:cNvPr id="36" name="Rectângulo 35"/>
+          <p:cNvSpPr/>
+          <p:nvPr/>
+        </p:nvSpPr>
+        <p:spPr>
+          <a:xfrm>
+            <a:off x="23433081" y="8136881"/>
+            <a:ext cx="6810382" cy="6332634"/>
+          </a:xfrm>
+          <a:prstGeom prst="rect">
+            <a:avLst/>
+          </a:prstGeom>
+        </p:spPr>
+        <p:style>
+          <a:lnRef idx="1">
+            <a:schemeClr val="dk1"/>
+          </a:lnRef>
+          <a:fillRef idx="2">
+            <a:schemeClr val="dk1"/>
+          </a:fillRef>
+          <a:effectRef idx="1">
+            <a:schemeClr val="dk1"/>
+          </a:effectRef>
+          <a:fontRef idx="minor">
+            <a:schemeClr val="dk1"/>
+          </a:fontRef>
+        </p:style>
+        <p:txBody>
+          <a:bodyPr lIns="180000" rIns="180000" rtlCol="0" anchor="t" anchorCtr="0"/>
+          <a:lstStyle/>
+          <a:p>
+            <a:pPr algn="just"/>
+            <a:r>
+              <a:rPr lang="en-US" sz="6600" cap="small" dirty="0">
+                <a:latin typeface="Arial Black" pitchFamily="34" charset="0"/>
+                <a:cs typeface="Arial" pitchFamily="34" charset="0"/>
+              </a:rPr>
+              <a:t>Rules</a:t>
+            </a:r>
+          </a:p>
+          <a:p>
+            <a:pPr algn="just"/>
+            <a:r>
+              <a:rPr lang="en-US" sz="4000" dirty="0" smtClean="0">
+                <a:latin typeface="Arial" pitchFamily="34" charset="0"/>
+                <a:cs typeface="Arial" pitchFamily="34" charset="0"/>
+              </a:rPr>
+              <a:t>Four rules for the minimum and maximum </a:t>
+            </a:r>
+          </a:p>
+          <a:p>
+            <a:pPr algn="just"/>
+            <a:endParaRPr lang="en-US" sz="8800" cap="small" dirty="0">
               <a:latin typeface="Arial Black" pitchFamily="34" charset="0"/>
+              <a:cs typeface="Arial" pitchFamily="34" charset="0"/>
+            </a:endParaRPr>
+          </a:p>
+        </p:txBody>
+      </p:sp>
+      <p:sp>
+        <p:nvSpPr>
+          <p:cNvPr id="37" name="Rectângulo 36"/>
+          <p:cNvSpPr/>
+          <p:nvPr/>
+        </p:nvSpPr>
+        <p:spPr>
+          <a:xfrm>
+            <a:off x="18722131" y="35604442"/>
+            <a:ext cx="11312294" cy="6332634"/>
+          </a:xfrm>
+          <a:prstGeom prst="rect">
+            <a:avLst/>
+          </a:prstGeom>
+        </p:spPr>
+        <p:style>
+          <a:lnRef idx="1">
+            <a:schemeClr val="dk1"/>
+          </a:lnRef>
+          <a:fillRef idx="2">
+            <a:schemeClr val="dk1"/>
+          </a:fillRef>
+          <a:effectRef idx="1">
+            <a:schemeClr val="dk1"/>
+          </a:effectRef>
+          <a:fontRef idx="minor">
+            <a:schemeClr val="dk1"/>
+          </a:fontRef>
+        </p:style>
+        <p:txBody>
+          <a:bodyPr lIns="180000" rIns="180000" rtlCol="0" anchor="t" anchorCtr="0"/>
+          <a:lstStyle/>
+          <a:p>
+            <a:pPr algn="just"/>
+            <a:r>
+              <a:rPr lang="en-US" sz="6600" cap="small" dirty="0">
+                <a:latin typeface="Arial Black" pitchFamily="34" charset="0"/>
+                <a:cs typeface="Arial" pitchFamily="34" charset="0"/>
+              </a:rPr>
+              <a:t>Conclusions</a:t>
+            </a:r>
+          </a:p>
+          <a:p>
+            <a:pPr algn="just">
+              <a:buFont typeface="Arial" pitchFamily="34" charset="0"/>
+              <a:buChar char="•"/>
+            </a:pPr>
+            <a:r>
+              <a:rPr lang="en-US" sz="4800" dirty="0">
+                <a:latin typeface="Arial" pitchFamily="34" charset="0"/>
+                <a:cs typeface="Arial" pitchFamily="34" charset="0"/>
+              </a:rPr>
+              <a:t>EAC is now applicable to a wider spectrum of datasets.</a:t>
+            </a:r>
+          </a:p>
+          <a:p>
+            <a:pPr algn="just">
+              <a:buFont typeface="Arial" pitchFamily="34" charset="0"/>
+              <a:buChar char="•"/>
+            </a:pPr>
+            <a:r>
+              <a:rPr lang="en-US" sz="4800" dirty="0">
+                <a:latin typeface="Arial" pitchFamily="34" charset="0"/>
+                <a:cs typeface="Arial" pitchFamily="34" charset="0"/>
+              </a:rPr>
+              <a:t>Speed-up from 6 to 200 compared to original implementation on the different phases.</a:t>
+            </a:r>
+          </a:p>
+        </p:txBody>
+      </p:sp>
+      <p:sp>
+        <p:nvSpPr>
+          <p:cNvPr id="38" name="Rectângulo arredondado 37"/>
+          <p:cNvSpPr/>
+          <p:nvPr/>
+        </p:nvSpPr>
+        <p:spPr>
+          <a:xfrm>
+            <a:off x="5231169" y="16024116"/>
+            <a:ext cx="4525499" cy="1767432"/>
+          </a:xfrm>
+          <a:prstGeom prst="roundRect">
+            <a:avLst/>
+          </a:prstGeom>
+        </p:spPr>
+        <p:style>
+          <a:lnRef idx="2">
+            <a:schemeClr val="accent1"/>
+          </a:lnRef>
+          <a:fillRef idx="1">
+            <a:schemeClr val="lt1"/>
+          </a:fillRef>
+          <a:effectRef idx="0">
+            <a:schemeClr val="accent1"/>
+          </a:effectRef>
+          <a:fontRef idx="minor">
+            <a:schemeClr val="dk1"/>
+          </a:fontRef>
+        </p:style>
+        <p:txBody>
+          <a:bodyPr rtlCol="0" anchor="ctr"/>
+          <a:lstStyle/>
+          <a:p>
+            <a:pPr algn="ctr"/>
+            <a:r>
+              <a:rPr lang="en-US" sz="3600" dirty="0" smtClean="0">
+                <a:latin typeface="Arial Black" pitchFamily="34" charset="0"/>
+                <a:cs typeface="Arial" pitchFamily="34" charset="0"/>
+              </a:rPr>
+              <a:t>Challenge</a:t>
+            </a:r>
+          </a:p>
+          <a:p>
+            <a:pPr algn="ctr"/>
+            <a:r>
+              <a:rPr lang="en-US" sz="3600" dirty="0" smtClean="0">
+                <a:latin typeface="Arial" pitchFamily="34" charset="0"/>
+                <a:cs typeface="Arial" pitchFamily="34" charset="0"/>
+              </a:rPr>
+              <a:t>Fast generation of ensemble.</a:t>
+            </a:r>
+            <a:endParaRPr lang="en-US" sz="3600" dirty="0">
+              <a:latin typeface="Arial" pitchFamily="34" charset="0"/>
+              <a:cs typeface="Arial" pitchFamily="34" charset="0"/>
+            </a:endParaRPr>
+          </a:p>
+        </p:txBody>
+      </p:sp>
+      <p:sp>
+        <p:nvSpPr>
+          <p:cNvPr id="39" name="Rectângulo arredondado 38"/>
+          <p:cNvSpPr/>
+          <p:nvPr/>
+        </p:nvSpPr>
+        <p:spPr>
+          <a:xfrm>
+            <a:off x="5493824" y="25189717"/>
+            <a:ext cx="4056885" cy="2017461"/>
+          </a:xfrm>
+          <a:prstGeom prst="roundRect">
+            <a:avLst/>
+          </a:prstGeom>
+        </p:spPr>
+        <p:style>
+          <a:lnRef idx="2">
+            <a:schemeClr val="accent4"/>
+          </a:lnRef>
+          <a:fillRef idx="1">
+            <a:schemeClr val="lt1"/>
+          </a:fillRef>
+          <a:effectRef idx="0">
+            <a:schemeClr val="accent4"/>
+          </a:effectRef>
+          <a:fontRef idx="minor">
+            <a:schemeClr val="dk1"/>
+          </a:fontRef>
+        </p:style>
+        <p:txBody>
+          <a:bodyPr rtlCol="0" anchor="ctr"/>
+          <a:lstStyle/>
+          <a:p>
+            <a:pPr algn="ctr"/>
+            <a:r>
+              <a:rPr lang="en-US" sz="3600" dirty="0" smtClean="0">
+                <a:latin typeface="Arial Black" pitchFamily="34" charset="0"/>
+                <a:cs typeface="Arial" pitchFamily="34" charset="0"/>
+              </a:rPr>
+              <a:t>Challenge</a:t>
+            </a:r>
+          </a:p>
+          <a:p>
+            <a:pPr algn="ctr"/>
+            <a:r>
+              <a:rPr lang="en-US" sz="3600" dirty="0" smtClean="0">
+                <a:latin typeface="Arial" pitchFamily="34" charset="0"/>
+                <a:cs typeface="Arial" pitchFamily="34" charset="0"/>
+              </a:rPr>
+              <a:t>O(n</a:t>
+            </a:r>
+            <a:r>
+              <a:rPr lang="en-US" sz="3600" baseline="30000" dirty="0" smtClean="0">
+                <a:latin typeface="Arial" pitchFamily="34" charset="0"/>
+                <a:cs typeface="Arial" pitchFamily="34" charset="0"/>
+              </a:rPr>
+              <a:t>2</a:t>
+            </a:r>
+            <a:r>
+              <a:rPr lang="en-US" sz="3600" dirty="0" smtClean="0">
+                <a:latin typeface="Arial" pitchFamily="34" charset="0"/>
+                <a:cs typeface="Arial" pitchFamily="34" charset="0"/>
+              </a:rPr>
+              <a:t>) space complexity</a:t>
+            </a:r>
+            <a:endParaRPr lang="en-US" sz="3600" dirty="0">
+              <a:latin typeface="Arial" pitchFamily="34" charset="0"/>
+              <a:cs typeface="Arial" pitchFamily="34" charset="0"/>
+            </a:endParaRPr>
+          </a:p>
+        </p:txBody>
+      </p:sp>
+      <p:sp>
+        <p:nvSpPr>
+          <p:cNvPr id="40" name="Rectângulo arredondado 39"/>
+          <p:cNvSpPr/>
+          <p:nvPr/>
+        </p:nvSpPr>
+        <p:spPr>
+          <a:xfrm>
+            <a:off x="1405635" y="37516145"/>
+            <a:ext cx="3929090" cy="1899349"/>
+          </a:xfrm>
+          <a:prstGeom prst="roundRect">
+            <a:avLst/>
+          </a:prstGeom>
+        </p:spPr>
+        <p:style>
+          <a:lnRef idx="2">
+            <a:schemeClr val="accent6"/>
+          </a:lnRef>
+          <a:fillRef idx="1">
+            <a:schemeClr val="lt1"/>
+          </a:fillRef>
+          <a:effectRef idx="0">
+            <a:schemeClr val="accent6"/>
+          </a:effectRef>
+          <a:fontRef idx="minor">
+            <a:schemeClr val="dk1"/>
+          </a:fontRef>
+        </p:style>
+        <p:txBody>
+          <a:bodyPr rtlCol="0" anchor="ctr"/>
+          <a:lstStyle/>
+          <a:p>
+            <a:pPr algn="ctr"/>
+            <a:r>
+              <a:rPr lang="en-US" sz="3600" dirty="0" smtClean="0">
+                <a:latin typeface="Arial Black" pitchFamily="34" charset="0"/>
+                <a:cs typeface="Arial" pitchFamily="34" charset="0"/>
+              </a:rPr>
+              <a:t>Challenge</a:t>
+            </a:r>
+          </a:p>
+          <a:p>
+            <a:pPr algn="ctr"/>
+            <a:r>
+              <a:rPr lang="en-US" sz="3600" dirty="0" smtClean="0">
+                <a:latin typeface="Arial" pitchFamily="34" charset="0"/>
+                <a:cs typeface="Arial" pitchFamily="34" charset="0"/>
+              </a:rPr>
+              <a:t>O(n</a:t>
+            </a:r>
+            <a:r>
+              <a:rPr lang="en-US" sz="3600" baseline="30000" dirty="0" smtClean="0">
+                <a:latin typeface="Arial" pitchFamily="34" charset="0"/>
+                <a:cs typeface="Arial" pitchFamily="34" charset="0"/>
+              </a:rPr>
+              <a:t>2</a:t>
+            </a:r>
+            <a:r>
+              <a:rPr lang="en-US" sz="3600" dirty="0" smtClean="0">
+                <a:latin typeface="Arial" pitchFamily="34" charset="0"/>
+                <a:cs typeface="Arial" pitchFamily="34" charset="0"/>
+              </a:rPr>
+              <a:t>) space complexity</a:t>
+            </a:r>
+            <a:endParaRPr lang="en-US" sz="3600" dirty="0">
+              <a:latin typeface="Arial" pitchFamily="34" charset="0"/>
               <a:cs typeface="Arial" pitchFamily="34" charset="0"/>
             </a:endParaRPr>
           </a:p>

</xml_diff>